<commit_message>
add lambda as appsync datasource
</commit_message>
<xml_diff>
--- a/docs/architecture.pptx
+++ b/docs/architecture.pptx
@@ -108,6 +108,11 @@
       </a:defRPr>
     </a:lvl9pPr>
   </p:defaultTextStyle>
+  <p:extLst>
+    <p:ext uri="{EFAFB233-063F-42B5-8137-9DF3F51BA10A}">
+      <p15:sldGuideLst xmlns:p15="http://schemas.microsoft.com/office/powerpoint/2012/main"/>
+    </p:ext>
+  </p:extLst>
 </p:presentation>
 </file>
 
@@ -193,7 +198,7 @@
           <a:p>
             <a:fld id="{537AF1B6-6FF1-7543-AC6C-7D0535AFB76D}" type="datetimeFigureOut">
               <a:rPr lang="en-US" smtClean="0"/>
-              <a:t>5/8/20</a:t>
+              <a:t>5/11/20</a:t>
             </a:fld>
             <a:endParaRPr lang="en-US"/>
           </a:p>
@@ -620,7 +625,7 @@
           <a:p>
             <a:fld id="{FFF12E51-CEF6-41C7-A61A-4B226C93BB6F}" type="datetime8">
               <a:rPr lang="en-US" smtClean="0"/>
-              <a:t>5/8/20 4:08 PM</a:t>
+              <a:t>5/11/20 2:38 PM</a:t>
             </a:fld>
             <a:endParaRPr lang="en-US" dirty="0"/>
           </a:p>
@@ -823,7 +828,7 @@
           <a:p>
             <a:fld id="{FFF12E51-CEF6-41C7-A61A-4B226C93BB6F}" type="datetime8">
               <a:rPr lang="en-US" smtClean="0"/>
-              <a:t>5/8/20 4:11 PM</a:t>
+              <a:t>5/11/20 2:37 PM</a:t>
             </a:fld>
             <a:endParaRPr lang="en-US" dirty="0"/>
           </a:p>
@@ -1013,7 +1018,7 @@
           <a:p>
             <a:fld id="{6B87285C-1C2F-E74F-8C1A-627626474F13}" type="datetimeFigureOut">
               <a:rPr lang="en-US" smtClean="0"/>
-              <a:t>5/8/20</a:t>
+              <a:t>5/11/20</a:t>
             </a:fld>
             <a:endParaRPr lang="en-US"/>
           </a:p>
@@ -1211,7 +1216,7 @@
           <a:p>
             <a:fld id="{6B87285C-1C2F-E74F-8C1A-627626474F13}" type="datetimeFigureOut">
               <a:rPr lang="en-US" smtClean="0"/>
-              <a:t>5/8/20</a:t>
+              <a:t>5/11/20</a:t>
             </a:fld>
             <a:endParaRPr lang="en-US"/>
           </a:p>
@@ -1419,7 +1424,7 @@
           <a:p>
             <a:fld id="{6B87285C-1C2F-E74F-8C1A-627626474F13}" type="datetimeFigureOut">
               <a:rPr lang="en-US" smtClean="0"/>
-              <a:t>5/8/20</a:t>
+              <a:t>5/11/20</a:t>
             </a:fld>
             <a:endParaRPr lang="en-US"/>
           </a:p>
@@ -1687,7 +1692,7 @@
           <a:p>
             <a:fld id="{6B87285C-1C2F-E74F-8C1A-627626474F13}" type="datetimeFigureOut">
               <a:rPr lang="en-US" smtClean="0"/>
-              <a:t>5/8/20</a:t>
+              <a:t>5/11/20</a:t>
             </a:fld>
             <a:endParaRPr lang="en-US"/>
           </a:p>
@@ -1962,7 +1967,7 @@
           <a:p>
             <a:fld id="{6B87285C-1C2F-E74F-8C1A-627626474F13}" type="datetimeFigureOut">
               <a:rPr lang="en-US" smtClean="0"/>
-              <a:t>5/8/20</a:t>
+              <a:t>5/11/20</a:t>
             </a:fld>
             <a:endParaRPr lang="en-US"/>
           </a:p>
@@ -2227,7 +2232,7 @@
           <a:p>
             <a:fld id="{6B87285C-1C2F-E74F-8C1A-627626474F13}" type="datetimeFigureOut">
               <a:rPr lang="en-US" smtClean="0"/>
-              <a:t>5/8/20</a:t>
+              <a:t>5/11/20</a:t>
             </a:fld>
             <a:endParaRPr lang="en-US"/>
           </a:p>
@@ -2639,7 +2644,7 @@
           <a:p>
             <a:fld id="{6B87285C-1C2F-E74F-8C1A-627626474F13}" type="datetimeFigureOut">
               <a:rPr lang="en-US" smtClean="0"/>
-              <a:t>5/8/20</a:t>
+              <a:t>5/11/20</a:t>
             </a:fld>
             <a:endParaRPr lang="en-US"/>
           </a:p>
@@ -2780,7 +2785,7 @@
           <a:p>
             <a:fld id="{6B87285C-1C2F-E74F-8C1A-627626474F13}" type="datetimeFigureOut">
               <a:rPr lang="en-US" smtClean="0"/>
-              <a:t>5/8/20</a:t>
+              <a:t>5/11/20</a:t>
             </a:fld>
             <a:endParaRPr lang="en-US"/>
           </a:p>
@@ -2893,7 +2898,7 @@
           <a:p>
             <a:fld id="{6B87285C-1C2F-E74F-8C1A-627626474F13}" type="datetimeFigureOut">
               <a:rPr lang="en-US" smtClean="0"/>
-              <a:t>5/8/20</a:t>
+              <a:t>5/11/20</a:t>
             </a:fld>
             <a:endParaRPr lang="en-US"/>
           </a:p>
@@ -3204,7 +3209,7 @@
           <a:p>
             <a:fld id="{6B87285C-1C2F-E74F-8C1A-627626474F13}" type="datetimeFigureOut">
               <a:rPr lang="en-US" smtClean="0"/>
-              <a:t>5/8/20</a:t>
+              <a:t>5/11/20</a:t>
             </a:fld>
             <a:endParaRPr lang="en-US"/>
           </a:p>
@@ -3492,7 +3497,7 @@
           <a:p>
             <a:fld id="{6B87285C-1C2F-E74F-8C1A-627626474F13}" type="datetimeFigureOut">
               <a:rPr lang="en-US" smtClean="0"/>
-              <a:t>5/8/20</a:t>
+              <a:t>5/11/20</a:t>
             </a:fld>
             <a:endParaRPr lang="en-US"/>
           </a:p>
@@ -3733,7 +3738,7 @@
           <a:p>
             <a:fld id="{6B87285C-1C2F-E74F-8C1A-627626474F13}" type="datetimeFigureOut">
               <a:rPr lang="en-US" smtClean="0"/>
-              <a:t>5/8/20</a:t>
+              <a:t>5/11/20</a:t>
             </a:fld>
             <a:endParaRPr lang="en-US"/>
           </a:p>
@@ -5214,42 +5219,6 @@
           </a:fontRef>
         </p:style>
       </p:cxnSp>
-      <p:pic>
-        <p:nvPicPr>
-          <p:cNvPr id="114" name="Graphic 113">
-            <a:extLst>
-              <a:ext uri="{FF2B5EF4-FFF2-40B4-BE49-F238E27FC236}">
-                <a16:creationId xmlns:a16="http://schemas.microsoft.com/office/drawing/2014/main" id="{9B670E10-8D4A-0442-A2B4-ECD5CCE8B56B}"/>
-              </a:ext>
-            </a:extLst>
-          </p:cNvPr>
-          <p:cNvPicPr>
-            <a:picLocks noChangeAspect="1"/>
-          </p:cNvPicPr>
-          <p:nvPr/>
-        </p:nvPicPr>
-        <p:blipFill>
-          <a:blip r:embed="rId21">
-            <a:extLst>
-              <a:ext uri="{96DAC541-7B7A-43D3-8B79-37D633B846F1}">
-                <asvg:svgBlip xmlns:asvg="http://schemas.microsoft.com/office/drawing/2016/SVG/main" r:embed="rId22"/>
-              </a:ext>
-            </a:extLst>
-          </a:blip>
-          <a:stretch>
-            <a:fillRect/>
-          </a:stretch>
-        </p:blipFill>
-        <p:spPr>
-          <a:xfrm>
-            <a:off x="8794979" y="545231"/>
-            <a:ext cx="592667" cy="592667"/>
-          </a:xfrm>
-          <a:prstGeom prst="rect">
-            <a:avLst/>
-          </a:prstGeom>
-        </p:spPr>
-      </p:pic>
       <p:cxnSp>
         <p:nvCxnSpPr>
           <p:cNvPr id="96" name="Elbow Connector 95">
@@ -5300,78 +5269,6 @@
       </p:cxnSp>
       <p:sp>
         <p:nvSpPr>
-          <p:cNvPr id="134" name="TextBox 133">
-            <a:extLst>
-              <a:ext uri="{FF2B5EF4-FFF2-40B4-BE49-F238E27FC236}">
-                <a16:creationId xmlns:a16="http://schemas.microsoft.com/office/drawing/2014/main" id="{FFC4B7A9-1587-0343-840A-1767119D95C4}"/>
-              </a:ext>
-            </a:extLst>
-          </p:cNvPr>
-          <p:cNvSpPr txBox="1"/>
-          <p:nvPr/>
-        </p:nvSpPr>
-        <p:spPr>
-          <a:xfrm>
-            <a:off x="8518254" y="1136482"/>
-            <a:ext cx="1146118" cy="233462"/>
-          </a:xfrm>
-          <a:prstGeom prst="rect">
-            <a:avLst/>
-          </a:prstGeom>
-          <a:noFill/>
-        </p:spPr>
-        <p:txBody>
-          <a:bodyPr wrap="square" rtlCol="0">
-            <a:spAutoFit/>
-          </a:bodyPr>
-          <a:lstStyle/>
-          <a:p>
-            <a:pPr algn="ctr"/>
-            <a:r>
-              <a:rPr lang="en-US" sz="917" dirty="0"/>
-              <a:t>AWS Cloud9</a:t>
-            </a:r>
-          </a:p>
-        </p:txBody>
-      </p:sp>
-      <p:pic>
-        <p:nvPicPr>
-          <p:cNvPr id="135" name="Graphic 134">
-            <a:extLst>
-              <a:ext uri="{FF2B5EF4-FFF2-40B4-BE49-F238E27FC236}">
-                <a16:creationId xmlns:a16="http://schemas.microsoft.com/office/drawing/2014/main" id="{05B0F8B2-8C04-2D46-9DFD-F5DF6ED0D21D}"/>
-              </a:ext>
-            </a:extLst>
-          </p:cNvPr>
-          <p:cNvPicPr>
-            <a:picLocks noChangeAspect="1"/>
-          </p:cNvPicPr>
-          <p:nvPr/>
-        </p:nvPicPr>
-        <p:blipFill>
-          <a:blip r:embed="rId23">
-            <a:extLst>
-              <a:ext uri="{96DAC541-7B7A-43D3-8B79-37D633B846F1}">
-                <asvg:svgBlip xmlns:asvg="http://schemas.microsoft.com/office/drawing/2016/SVG/main" r:embed="rId24"/>
-              </a:ext>
-            </a:extLst>
-          </a:blip>
-          <a:stretch>
-            <a:fillRect/>
-          </a:stretch>
-        </p:blipFill>
-        <p:spPr>
-          <a:xfrm>
-            <a:off x="9834625" y="553994"/>
-            <a:ext cx="592667" cy="592667"/>
-          </a:xfrm>
-          <a:prstGeom prst="rect">
-            <a:avLst/>
-          </a:prstGeom>
-        </p:spPr>
-      </p:pic>
-      <p:sp>
-        <p:nvSpPr>
           <p:cNvPr id="136" name="TextBox 135">
             <a:extLst>
               <a:ext uri="{FF2B5EF4-FFF2-40B4-BE49-F238E27FC236}">
@@ -5504,10 +5401,10 @@
           <p:nvPr/>
         </p:nvPicPr>
         <p:blipFill>
-          <a:blip r:embed="rId25">
+          <a:blip r:embed="rId21">
             <a:extLst>
               <a:ext uri="{96DAC541-7B7A-43D3-8B79-37D633B846F1}">
-                <asvg:svgBlip xmlns:asvg="http://schemas.microsoft.com/office/drawing/2016/SVG/main" r:embed="rId26"/>
+                <asvg:svgBlip xmlns:asvg="http://schemas.microsoft.com/office/drawing/2016/SVG/main" r:embed="rId22"/>
               </a:ext>
             </a:extLst>
           </a:blip>
@@ -5783,10 +5680,10 @@
           <p:nvPr/>
         </p:nvPicPr>
         <p:blipFill>
-          <a:blip r:embed="rId27">
+          <a:blip r:embed="rId23">
             <a:extLst>
               <a:ext uri="{96DAC541-7B7A-43D3-8B79-37D633B846F1}">
-                <asvg:svgBlip xmlns:asvg="http://schemas.microsoft.com/office/drawing/2016/SVG/main" r:embed="rId28"/>
+                <asvg:svgBlip xmlns:asvg="http://schemas.microsoft.com/office/drawing/2016/SVG/main" r:embed="rId24"/>
               </a:ext>
             </a:extLst>
           </a:blip>
@@ -5819,10 +5716,10 @@
           <p:nvPr/>
         </p:nvPicPr>
         <p:blipFill>
-          <a:blip r:embed="rId29">
+          <a:blip r:embed="rId25">
             <a:extLst>
               <a:ext uri="{96DAC541-7B7A-43D3-8B79-37D633B846F1}">
-                <asvg:svgBlip xmlns:asvg="http://schemas.microsoft.com/office/drawing/2016/SVG/main" r:embed="rId30"/>
+                <asvg:svgBlip xmlns:asvg="http://schemas.microsoft.com/office/drawing/2016/SVG/main" r:embed="rId26"/>
               </a:ext>
             </a:extLst>
           </a:blip>
@@ -5891,10 +5788,10 @@
           <p:nvPr/>
         </p:nvPicPr>
         <p:blipFill>
-          <a:blip r:embed="rId31">
+          <a:blip r:embed="rId27">
             <a:extLst>
               <a:ext uri="{96DAC541-7B7A-43D3-8B79-37D633B846F1}">
-                <asvg:svgBlip xmlns:asvg="http://schemas.microsoft.com/office/drawing/2016/SVG/main" r:embed="rId32"/>
+                <asvg:svgBlip xmlns:asvg="http://schemas.microsoft.com/office/drawing/2016/SVG/main" r:embed="rId28"/>
               </a:ext>
             </a:extLst>
           </a:blip>
@@ -6010,10 +5907,10 @@
           <p:nvPr/>
         </p:nvPicPr>
         <p:blipFill>
-          <a:blip r:embed="rId25">
+          <a:blip r:embed="rId21">
             <a:extLst>
               <a:ext uri="{96DAC541-7B7A-43D3-8B79-37D633B846F1}">
-                <asvg:svgBlip xmlns:asvg="http://schemas.microsoft.com/office/drawing/2016/SVG/main" r:embed="rId26"/>
+                <asvg:svgBlip xmlns:asvg="http://schemas.microsoft.com/office/drawing/2016/SVG/main" r:embed="rId22"/>
               </a:ext>
             </a:extLst>
           </a:blip>
@@ -6157,6 +6054,122 @@
           </a:p>
         </p:txBody>
       </p:sp>
+      <p:sp>
+        <p:nvSpPr>
+          <p:cNvPr id="55" name="TextBox 54">
+            <a:extLst>
+              <a:ext uri="{FF2B5EF4-FFF2-40B4-BE49-F238E27FC236}">
+                <a16:creationId xmlns:a16="http://schemas.microsoft.com/office/drawing/2014/main" id="{29D4FE44-8562-F348-8863-0D3ECBCDAA21}"/>
+              </a:ext>
+            </a:extLst>
+          </p:cNvPr>
+          <p:cNvSpPr txBox="1"/>
+          <p:nvPr/>
+        </p:nvSpPr>
+        <p:spPr>
+          <a:xfrm>
+            <a:off x="4672377" y="955307"/>
+            <a:ext cx="1065310" cy="261610"/>
+          </a:xfrm>
+          <a:prstGeom prst="rect">
+            <a:avLst/>
+          </a:prstGeom>
+          <a:noFill/>
+        </p:spPr>
+        <p:txBody>
+          <a:bodyPr wrap="square" rtlCol="0">
+            <a:spAutoFit/>
+          </a:bodyPr>
+          <a:lstStyle/>
+          <a:p>
+            <a:pPr algn="ctr"/>
+            <a:r>
+              <a:rPr lang="en-US" sz="1100" dirty="0"/>
+              <a:t>S3</a:t>
+            </a:r>
+          </a:p>
+        </p:txBody>
+      </p:sp>
+      <p:pic>
+        <p:nvPicPr>
+          <p:cNvPr id="56" name="Graphic 55">
+            <a:extLst>
+              <a:ext uri="{FF2B5EF4-FFF2-40B4-BE49-F238E27FC236}">
+                <a16:creationId xmlns:a16="http://schemas.microsoft.com/office/drawing/2014/main" id="{39ABD624-7367-9847-8C41-D1955CD7F62F}"/>
+              </a:ext>
+            </a:extLst>
+          </p:cNvPr>
+          <p:cNvPicPr>
+            <a:picLocks noChangeAspect="1"/>
+          </p:cNvPicPr>
+          <p:nvPr/>
+        </p:nvPicPr>
+        <p:blipFill>
+          <a:blip r:embed="rId27">
+            <a:extLst>
+              <a:ext uri="{96DAC541-7B7A-43D3-8B79-37D633B846F1}">
+                <asvg:svgBlip xmlns:asvg="http://schemas.microsoft.com/office/drawing/2016/SVG/main" r:embed="rId28"/>
+              </a:ext>
+            </a:extLst>
+          </a:blip>
+          <a:stretch>
+            <a:fillRect/>
+          </a:stretch>
+        </p:blipFill>
+        <p:spPr>
+          <a:xfrm>
+            <a:off x="4485098" y="766072"/>
+            <a:ext cx="592667" cy="592667"/>
+          </a:xfrm>
+          <a:prstGeom prst="rect">
+            <a:avLst/>
+          </a:prstGeom>
+        </p:spPr>
+      </p:pic>
+      <p:cxnSp>
+        <p:nvCxnSpPr>
+          <p:cNvPr id="57" name="Straight Arrow Connector 56">
+            <a:extLst>
+              <a:ext uri="{FF2B5EF4-FFF2-40B4-BE49-F238E27FC236}">
+                <a16:creationId xmlns:a16="http://schemas.microsoft.com/office/drawing/2014/main" id="{53BD519C-6A3F-874B-B158-6A2188E834C4}"/>
+              </a:ext>
+            </a:extLst>
+          </p:cNvPr>
+          <p:cNvCxnSpPr>
+            <a:endCxn id="56" idx="1"/>
+          </p:cNvCxnSpPr>
+          <p:nvPr/>
+        </p:nvCxnSpPr>
+        <p:spPr>
+          <a:xfrm flipV="1">
+            <a:off x="3442943" y="1062406"/>
+            <a:ext cx="1042155" cy="3560"/>
+          </a:xfrm>
+          <a:prstGeom prst="straightConnector1">
+            <a:avLst/>
+          </a:prstGeom>
+          <a:ln w="19050">
+            <a:solidFill>
+              <a:schemeClr val="tx1"/>
+            </a:solidFill>
+            <a:tailEnd type="triangle"/>
+          </a:ln>
+        </p:spPr>
+        <p:style>
+          <a:lnRef idx="1">
+            <a:schemeClr val="accent1"/>
+          </a:lnRef>
+          <a:fillRef idx="0">
+            <a:schemeClr val="accent1"/>
+          </a:fillRef>
+          <a:effectRef idx="0">
+            <a:schemeClr val="accent1"/>
+          </a:effectRef>
+          <a:fontRef idx="minor">
+            <a:schemeClr val="tx1"/>
+          </a:fontRef>
+        </p:style>
+      </p:cxnSp>
     </p:spTree>
     <p:extLst>
       <p:ext uri="{BB962C8B-B14F-4D97-AF65-F5344CB8AC3E}">
@@ -7196,7 +7209,7 @@
         </p:nvSpPr>
         <p:spPr>
           <a:xfrm>
-            <a:off x="3458355" y="850704"/>
+            <a:off x="3430660" y="847837"/>
             <a:ext cx="1141124" cy="451534"/>
           </a:xfrm>
           <a:prstGeom prst="rect">
@@ -9346,6 +9359,123 @@
           </a:p>
         </p:txBody>
       </p:sp>
+      <p:sp>
+        <p:nvSpPr>
+          <p:cNvPr id="83" name="TextBox 82">
+            <a:extLst>
+              <a:ext uri="{FF2B5EF4-FFF2-40B4-BE49-F238E27FC236}">
+                <a16:creationId xmlns:a16="http://schemas.microsoft.com/office/drawing/2014/main" id="{4A28E045-7206-6544-B94D-AC07BB74A85D}"/>
+              </a:ext>
+            </a:extLst>
+          </p:cNvPr>
+          <p:cNvSpPr txBox="1"/>
+          <p:nvPr/>
+        </p:nvSpPr>
+        <p:spPr>
+          <a:xfrm>
+            <a:off x="4672377" y="955307"/>
+            <a:ext cx="1065310" cy="261610"/>
+          </a:xfrm>
+          <a:prstGeom prst="rect">
+            <a:avLst/>
+          </a:prstGeom>
+          <a:noFill/>
+        </p:spPr>
+        <p:txBody>
+          <a:bodyPr wrap="square" rtlCol="0">
+            <a:spAutoFit/>
+          </a:bodyPr>
+          <a:lstStyle/>
+          <a:p>
+            <a:pPr algn="ctr"/>
+            <a:r>
+              <a:rPr lang="en-US" sz="1100" dirty="0"/>
+              <a:t>S3</a:t>
+            </a:r>
+          </a:p>
+        </p:txBody>
+      </p:sp>
+      <p:pic>
+        <p:nvPicPr>
+          <p:cNvPr id="85" name="Graphic 84">
+            <a:extLst>
+              <a:ext uri="{FF2B5EF4-FFF2-40B4-BE49-F238E27FC236}">
+                <a16:creationId xmlns:a16="http://schemas.microsoft.com/office/drawing/2014/main" id="{F8460CC7-7985-B947-B455-6923535E9DAA}"/>
+              </a:ext>
+            </a:extLst>
+          </p:cNvPr>
+          <p:cNvPicPr>
+            <a:picLocks noChangeAspect="1"/>
+          </p:cNvPicPr>
+          <p:nvPr/>
+        </p:nvPicPr>
+        <p:blipFill>
+          <a:blip r:embed="rId45">
+            <a:extLst>
+              <a:ext uri="{96DAC541-7B7A-43D3-8B79-37D633B846F1}">
+                <asvg:svgBlip xmlns:asvg="http://schemas.microsoft.com/office/drawing/2016/SVG/main" r:embed="rId46"/>
+              </a:ext>
+            </a:extLst>
+          </a:blip>
+          <a:stretch>
+            <a:fillRect/>
+          </a:stretch>
+        </p:blipFill>
+        <p:spPr>
+          <a:xfrm>
+            <a:off x="4485098" y="766072"/>
+            <a:ext cx="592667" cy="592667"/>
+          </a:xfrm>
+          <a:prstGeom prst="rect">
+            <a:avLst/>
+          </a:prstGeom>
+        </p:spPr>
+      </p:pic>
+      <p:cxnSp>
+        <p:nvCxnSpPr>
+          <p:cNvPr id="3" name="Straight Arrow Connector 2">
+            <a:extLst>
+              <a:ext uri="{FF2B5EF4-FFF2-40B4-BE49-F238E27FC236}">
+                <a16:creationId xmlns:a16="http://schemas.microsoft.com/office/drawing/2014/main" id="{886064A6-4741-2F45-9A24-CBDC3C9B5467}"/>
+              </a:ext>
+            </a:extLst>
+          </p:cNvPr>
+          <p:cNvCxnSpPr>
+            <a:stCxn id="174" idx="3"/>
+            <a:endCxn id="85" idx="1"/>
+          </p:cNvCxnSpPr>
+          <p:nvPr/>
+        </p:nvCxnSpPr>
+        <p:spPr>
+          <a:xfrm flipV="1">
+            <a:off x="3442943" y="1062406"/>
+            <a:ext cx="1042155" cy="3560"/>
+          </a:xfrm>
+          <a:prstGeom prst="straightConnector1">
+            <a:avLst/>
+          </a:prstGeom>
+          <a:ln w="19050">
+            <a:solidFill>
+              <a:schemeClr val="tx1"/>
+            </a:solidFill>
+            <a:tailEnd type="triangle"/>
+          </a:ln>
+        </p:spPr>
+        <p:style>
+          <a:lnRef idx="1">
+            <a:schemeClr val="accent1"/>
+          </a:lnRef>
+          <a:fillRef idx="0">
+            <a:schemeClr val="accent1"/>
+          </a:fillRef>
+          <a:effectRef idx="0">
+            <a:schemeClr val="accent1"/>
+          </a:effectRef>
+          <a:fontRef idx="minor">
+            <a:schemeClr val="tx1"/>
+          </a:fontRef>
+        </p:style>
+      </p:cxnSp>
     </p:spTree>
     <p:extLst>
       <p:ext uri="{BB962C8B-B14F-4D97-AF65-F5344CB8AC3E}">

</xml_diff>